<commit_message>
updated the introduction slides
</commit_message>
<xml_diff>
--- a/Presentations/1 - Introduction.pptx
+++ b/Presentations/1 - Introduction.pptx
@@ -228,7 +228,7 @@
           <a:p>
             <a:fld id="{FC61A6FD-3ACD-4666-B601-2198EA538879}" type="datetimeFigureOut">
               <a:rPr lang="en-US" smtClean="0"/>
-              <a:t>6/17/2019</a:t>
+              <a:t>6/18/2019</a:t>
             </a:fld>
             <a:endParaRPr lang="en-US"/>
           </a:p>
@@ -406,7 +406,7 @@
           <a:p>
             <a:fld id="{37DF9D4D-9EA6-4037-AB5B-4AEE090FBDF0}" type="datetimeFigureOut">
               <a:rPr lang="en-US" smtClean="0"/>
-              <a:t>6/17/2019</a:t>
+              <a:t>6/18/2019</a:t>
             </a:fld>
             <a:endParaRPr lang="en-US"/>
           </a:p>
@@ -3865,6 +3865,13 @@
   <p:clrMapOvr>
     <a:masterClrMapping/>
   </p:clrMapOvr>
+  <p:timing>
+    <p:tnLst>
+      <p:par>
+        <p:cTn id="1" dur="indefinite" restart="never" nodeType="tmRoot"/>
+      </p:par>
+    </p:tnLst>
+  </p:timing>
 </p:sld>
 </file>
 
@@ -4007,6 +4014,13 @@
   <p:clrMapOvr>
     <a:masterClrMapping/>
   </p:clrMapOvr>
+  <p:timing>
+    <p:tnLst>
+      <p:par>
+        <p:cTn id="1" dur="indefinite" restart="never" nodeType="tmRoot"/>
+      </p:par>
+    </p:tnLst>
+  </p:timing>
 </p:sld>
 </file>
 
@@ -4149,6 +4163,13 @@
   <p:clrMapOvr>
     <a:masterClrMapping/>
   </p:clrMapOvr>
+  <p:timing>
+    <p:tnLst>
+      <p:par>
+        <p:cTn id="1" dur="indefinite" restart="never" nodeType="tmRoot"/>
+      </p:par>
+    </p:tnLst>
+  </p:timing>
 </p:sld>
 </file>
 
@@ -4181,14 +4202,20 @@
         </p:nvSpPr>
         <p:spPr/>
         <p:txBody>
-          <a:bodyPr/>
-          <a:lstStyle/>
-          <a:p>
-            <a:r>
-              <a:rPr lang="en-US" dirty="0" smtClean="0"/>
-              <a:t>Learnings from P to P#</a:t>
-            </a:r>
-            <a:endParaRPr lang="en-US" dirty="0"/>
+          <a:bodyPr>
+            <a:noAutofit/>
+          </a:bodyPr>
+          <a:lstStyle/>
+          <a:p>
+            <a:r>
+              <a:rPr lang="en-US" sz="3600" dirty="0" smtClean="0"/>
+              <a:t>Journey and Learnings </a:t>
+            </a:r>
+            <a:r>
+              <a:rPr lang="en-US" sz="3600" dirty="0" smtClean="0"/>
+              <a:t>from P to P#</a:t>
+            </a:r>
+            <a:endParaRPr lang="en-US" sz="3600" dirty="0"/>
           </a:p>
         </p:txBody>
       </p:sp>
@@ -4291,6 +4318,13 @@
   <p:clrMapOvr>
     <a:masterClrMapping/>
   </p:clrMapOvr>
+  <p:timing>
+    <p:tnLst>
+      <p:par>
+        <p:cTn id="1" dur="indefinite" restart="never" nodeType="tmRoot"/>
+      </p:par>
+    </p:tnLst>
+  </p:timing>
 </p:sld>
 </file>
 
@@ -4439,6 +4473,13 @@
   <p:clrMapOvr>
     <a:masterClrMapping/>
   </p:clrMapOvr>
+  <p:timing>
+    <p:tnLst>
+      <p:par>
+        <p:cTn id="1" dur="indefinite" restart="never" nodeType="tmRoot"/>
+      </p:par>
+    </p:tnLst>
+  </p:timing>
 </p:sld>
 </file>
 
@@ -4494,10 +4535,75 @@
         </p:nvSpPr>
         <p:spPr/>
         <p:txBody>
-          <a:bodyPr/>
-          <a:lstStyle/>
-          <a:p>
-            <a:endParaRPr lang="en-US"/>
+          <a:bodyPr>
+            <a:normAutofit/>
+          </a:bodyPr>
+          <a:lstStyle/>
+          <a:p>
+            <a:pPr marL="342900" indent="-342900">
+              <a:buFont typeface="Arial" panose="020B0604020202020204" pitchFamily="34" charset="0"/>
+              <a:buChar char="•"/>
+            </a:pPr>
+            <a:r>
+              <a:rPr lang="en-US" sz="2400" dirty="0"/>
+              <a:t>Pantazis </a:t>
+            </a:r>
+            <a:r>
+              <a:rPr lang="en-US" sz="2400" dirty="0" smtClean="0"/>
+              <a:t>Deligiannis, Microsoft Research, Redmond.</a:t>
+            </a:r>
+          </a:p>
+          <a:p>
+            <a:pPr marL="342900" indent="-342900">
+              <a:buFont typeface="Arial" panose="020B0604020202020204" pitchFamily="34" charset="0"/>
+              <a:buChar char="•"/>
+            </a:pPr>
+            <a:endParaRPr lang="en-US" sz="2400" dirty="0"/>
+          </a:p>
+          <a:p>
+            <a:pPr marL="342900" indent="-342900">
+              <a:buFont typeface="Arial" panose="020B0604020202020204" pitchFamily="34" charset="0"/>
+              <a:buChar char="•"/>
+            </a:pPr>
+            <a:r>
+              <a:rPr lang="en-US" sz="2400" dirty="0" smtClean="0"/>
+              <a:t>Ankush Desai, University of California, Berkeley.</a:t>
+            </a:r>
+          </a:p>
+          <a:p>
+            <a:pPr marL="342900" indent="-342900">
+              <a:buFont typeface="Arial" panose="020B0604020202020204" pitchFamily="34" charset="0"/>
+              <a:buChar char="•"/>
+            </a:pPr>
+            <a:endParaRPr lang="en-US" sz="2400" dirty="0"/>
+          </a:p>
+          <a:p>
+            <a:pPr marL="342900" indent="-342900">
+              <a:buFont typeface="Arial" panose="020B0604020202020204" pitchFamily="34" charset="0"/>
+              <a:buChar char="•"/>
+            </a:pPr>
+            <a:r>
+              <a:rPr lang="en-US" sz="2400" dirty="0" smtClean="0"/>
+              <a:t>Akash Lal, Microsoft Research, Bangalore</a:t>
+            </a:r>
+          </a:p>
+          <a:p>
+            <a:pPr marL="342900" indent="-342900">
+              <a:buFont typeface="Arial" panose="020B0604020202020204" pitchFamily="34" charset="0"/>
+              <a:buChar char="•"/>
+            </a:pPr>
+            <a:endParaRPr lang="en-US" sz="2400" dirty="0"/>
+          </a:p>
+          <a:p>
+            <a:pPr marL="342900" indent="-342900">
+              <a:buFont typeface="Arial" panose="020B0604020202020204" pitchFamily="34" charset="0"/>
+              <a:buChar char="•"/>
+            </a:pPr>
+            <a:r>
+              <a:rPr lang="en-US" sz="2400" dirty="0" smtClean="0"/>
+              <a:t>Shaz Qadeer, Facebook, Menlo Park.</a:t>
+            </a:r>
+            <a:endParaRPr lang="en-US" sz="2400" dirty="0"/>
           </a:p>
         </p:txBody>
       </p:sp>
@@ -4636,10 +4742,130 @@
         </p:nvSpPr>
         <p:spPr/>
         <p:txBody>
-          <a:bodyPr/>
-          <a:lstStyle/>
-          <a:p>
-            <a:endParaRPr lang="en-US"/>
+          <a:bodyPr>
+            <a:normAutofit lnSpcReduction="10000"/>
+          </a:bodyPr>
+          <a:lstStyle/>
+          <a:p>
+            <a:pPr marL="342900" indent="-342900">
+              <a:buFont typeface="Arial" panose="020B0604020202020204" pitchFamily="34" charset="0"/>
+              <a:buChar char="•"/>
+            </a:pPr>
+            <a:r>
+              <a:rPr lang="en-US" b="1" dirty="0" smtClean="0"/>
+              <a:t>Part 1 (09:00 </a:t>
+            </a:r>
+            <a:r>
+              <a:rPr lang="en-US" b="1" dirty="0"/>
+              <a:t>- </a:t>
+            </a:r>
+            <a:r>
+              <a:rPr lang="en-US" b="1" dirty="0" smtClean="0"/>
+              <a:t>10:00) : Introduction to the P language.</a:t>
+            </a:r>
+          </a:p>
+          <a:p>
+            <a:pPr marL="829818" lvl="1" indent="-342900"/>
+            <a:r>
+              <a:rPr lang="en-US" b="1" dirty="0" smtClean="0"/>
+              <a:t>Introduction, evolution of P, and an overview of the P language</a:t>
+            </a:r>
+            <a:endParaRPr lang="en-US" b="1" dirty="0"/>
+          </a:p>
+          <a:p>
+            <a:pPr marL="342900" indent="-342900">
+              <a:buFont typeface="Arial" panose="020B0604020202020204" pitchFamily="34" charset="0"/>
+              <a:buChar char="•"/>
+            </a:pPr>
+            <a:r>
+              <a:rPr lang="en-US" b="1" dirty="0" smtClean="0"/>
+              <a:t>Part 2 (10:00 – 11:00):  P# Runtime.</a:t>
+            </a:r>
+          </a:p>
+          <a:p>
+            <a:pPr marL="829818" lvl="1" indent="-342900"/>
+            <a:r>
+              <a:rPr lang="en-US" b="1" dirty="0" smtClean="0"/>
+              <a:t>Introduction and a tutorial on the P# programming framework, a C# runtime for P.  </a:t>
+            </a:r>
+            <a:endParaRPr lang="en-US" b="1" dirty="0"/>
+          </a:p>
+          <a:p>
+            <a:pPr marL="342900" indent="-342900">
+              <a:buFont typeface="Arial" panose="020B0604020202020204" pitchFamily="34" charset="0"/>
+              <a:buChar char="•"/>
+            </a:pPr>
+            <a:r>
+              <a:rPr lang="en-US" b="1" dirty="0" smtClean="0"/>
+              <a:t>Part 3 (11:20 – 12:30): Building Distributed Services using P# </a:t>
+            </a:r>
+            <a:endParaRPr lang="en-US" dirty="0"/>
+          </a:p>
+          <a:p>
+            <a:pPr marL="829818" lvl="1" indent="-342900"/>
+            <a:r>
+              <a:rPr lang="en-US" b="1" dirty="0" smtClean="0"/>
+              <a:t>Building reliable distributed services using P# and the Reliable State Machines (RSM) framework </a:t>
+            </a:r>
+            <a:r>
+              <a:rPr lang="en-US" b="1" dirty="0"/>
+              <a:t>(at Microsoft Azure) </a:t>
+            </a:r>
+            <a:r>
+              <a:rPr lang="en-US" b="1" dirty="0" smtClean="0"/>
+              <a:t>.</a:t>
+            </a:r>
+          </a:p>
+          <a:p>
+            <a:pPr marL="342900" indent="-342900">
+              <a:buFont typeface="Arial" panose="020B0604020202020204" pitchFamily="34" charset="0"/>
+              <a:buChar char="•"/>
+            </a:pPr>
+            <a:r>
+              <a:rPr lang="en-US" b="1" dirty="0" smtClean="0"/>
+              <a:t>Part 4 (14:00 – 15: 30): Safety Testing of </a:t>
+            </a:r>
+            <a:r>
+              <a:rPr lang="en-US" b="1" dirty="0" err="1" smtClean="0"/>
+              <a:t>Async</a:t>
+            </a:r>
+            <a:r>
+              <a:rPr lang="en-US" b="1" dirty="0" smtClean="0"/>
+              <a:t>. Systems.</a:t>
+            </a:r>
+          </a:p>
+          <a:p>
+            <a:pPr marL="829818" lvl="1" indent="-342900"/>
+            <a:r>
+              <a:rPr lang="en-US" b="1" dirty="0" smtClean="0"/>
+              <a:t>From scalable monolithic to compositional testing of asynchronous systems.</a:t>
+            </a:r>
+          </a:p>
+          <a:p>
+            <a:pPr marL="342900" indent="-342900">
+              <a:buFont typeface="Arial" panose="020B0604020202020204" pitchFamily="34" charset="0"/>
+              <a:buChar char="•"/>
+            </a:pPr>
+            <a:r>
+              <a:rPr lang="en-US" b="1" dirty="0" smtClean="0"/>
+              <a:t>Part 5 (16:00 – 17:00): Liveness Testing of </a:t>
+            </a:r>
+            <a:r>
+              <a:rPr lang="en-US" b="1" dirty="0" err="1" smtClean="0"/>
+              <a:t>Async</a:t>
+            </a:r>
+            <a:r>
+              <a:rPr lang="en-US" b="1" dirty="0" smtClean="0"/>
+              <a:t>. Systems.</a:t>
+            </a:r>
+          </a:p>
+          <a:p>
+            <a:pPr marL="829818" lvl="1" indent="-342900"/>
+            <a:r>
+              <a:rPr lang="en-US" b="1" dirty="0" smtClean="0"/>
+              <a:t>Specifying and Finding liveness violations in real-world distributed systems.</a:t>
+            </a:r>
+            <a:endParaRPr lang="en-US" b="1" dirty="0"/>
           </a:p>
         </p:txBody>
       </p:sp>
@@ -5434,8 +5660,13 @@
             <a:pPr marL="829818" lvl="1" indent="-342900"/>
             <a:r>
               <a:rPr lang="en-US" sz="2000" dirty="0"/>
-              <a:t>Processes communicate by asynchronously sending messages or events to each other.</a:t>
-            </a:r>
+              <a:t>Processes communicate by asynchronously sending messages or events to each </a:t>
+            </a:r>
+            <a:r>
+              <a:rPr lang="en-US" sz="2000" dirty="0" smtClean="0"/>
+              <a:t>other (no shared memory).</a:t>
+            </a:r>
+            <a:endParaRPr lang="en-US" sz="2000" dirty="0"/>
           </a:p>
           <a:p>
             <a:pPr marL="829818" lvl="1" indent="-342900"/>
@@ -5549,6 +5780,13 @@
   <p:clrMapOvr>
     <a:masterClrMapping/>
   </p:clrMapOvr>
+  <p:timing>
+    <p:tnLst>
+      <p:par>
+        <p:cTn id="1" dur="indefinite" restart="never" nodeType="tmRoot"/>
+      </p:par>
+    </p:tnLst>
+  </p:timing>
 </p:sld>
 </file>
 
@@ -6807,237 +7045,7 @@
   <p:timing>
     <p:tnLst>
       <p:par>
-        <p:cTn id="1" dur="indefinite" restart="never" nodeType="tmRoot">
-          <p:childTnLst>
-            <p:seq concurrent="1" nextAc="seek">
-              <p:cTn id="2" dur="indefinite" nodeType="mainSeq">
-                <p:childTnLst>
-                  <p:par>
-                    <p:cTn id="3" fill="hold">
-                      <p:stCondLst>
-                        <p:cond delay="indefinite"/>
-                      </p:stCondLst>
-                      <p:childTnLst>
-                        <p:par>
-                          <p:cTn id="4" fill="hold">
-                            <p:stCondLst>
-                              <p:cond delay="0"/>
-                            </p:stCondLst>
-                            <p:childTnLst>
-                              <p:par>
-                                <p:cTn id="5" presetID="1" presetClass="entr" presetSubtype="0" fill="hold" nodeType="clickEffect">
-                                  <p:stCondLst>
-                                    <p:cond delay="0"/>
-                                  </p:stCondLst>
-                                  <p:childTnLst>
-                                    <p:set>
-                                      <p:cBhvr>
-                                        <p:cTn id="6" dur="1" fill="hold">
-                                          <p:stCondLst>
-                                            <p:cond delay="0"/>
-                                          </p:stCondLst>
-                                        </p:cTn>
-                                        <p:tgtEl>
-                                          <p:spTgt spid="27"/>
-                                        </p:tgtEl>
-                                        <p:attrNameLst>
-                                          <p:attrName>style.visibility</p:attrName>
-                                        </p:attrNameLst>
-                                      </p:cBhvr>
-                                      <p:to>
-                                        <p:strVal val="visible"/>
-                                      </p:to>
-                                    </p:set>
-                                  </p:childTnLst>
-                                </p:cTn>
-                              </p:par>
-                              <p:par>
-                                <p:cTn id="7" presetID="1" presetClass="entr" presetSubtype="0" fill="hold" nodeType="withEffect">
-                                  <p:stCondLst>
-                                    <p:cond delay="0"/>
-                                  </p:stCondLst>
-                                  <p:childTnLst>
-                                    <p:set>
-                                      <p:cBhvr>
-                                        <p:cTn id="8" dur="1" fill="hold">
-                                          <p:stCondLst>
-                                            <p:cond delay="0"/>
-                                          </p:stCondLst>
-                                        </p:cTn>
-                                        <p:tgtEl>
-                                          <p:spTgt spid="19"/>
-                                        </p:tgtEl>
-                                        <p:attrNameLst>
-                                          <p:attrName>style.visibility</p:attrName>
-                                        </p:attrNameLst>
-                                      </p:cBhvr>
-                                      <p:to>
-                                        <p:strVal val="visible"/>
-                                      </p:to>
-                                    </p:set>
-                                  </p:childTnLst>
-                                </p:cTn>
-                              </p:par>
-                            </p:childTnLst>
-                          </p:cTn>
-                        </p:par>
-                      </p:childTnLst>
-                    </p:cTn>
-                  </p:par>
-                  <p:par>
-                    <p:cTn id="9" fill="hold">
-                      <p:stCondLst>
-                        <p:cond delay="indefinite"/>
-                      </p:stCondLst>
-                      <p:childTnLst>
-                        <p:par>
-                          <p:cTn id="10" fill="hold">
-                            <p:stCondLst>
-                              <p:cond delay="0"/>
-                            </p:stCondLst>
-                            <p:childTnLst>
-                              <p:par>
-                                <p:cTn id="11" presetID="1" presetClass="entr" presetSubtype="0" fill="hold" nodeType="clickEffect">
-                                  <p:stCondLst>
-                                    <p:cond delay="0"/>
-                                  </p:stCondLst>
-                                  <p:childTnLst>
-                                    <p:set>
-                                      <p:cBhvr>
-                                        <p:cTn id="12" dur="1" fill="hold">
-                                          <p:stCondLst>
-                                            <p:cond delay="0"/>
-                                          </p:stCondLst>
-                                        </p:cTn>
-                                        <p:tgtEl>
-                                          <p:spTgt spid="35"/>
-                                        </p:tgtEl>
-                                        <p:attrNameLst>
-                                          <p:attrName>style.visibility</p:attrName>
-                                        </p:attrNameLst>
-                                      </p:cBhvr>
-                                      <p:to>
-                                        <p:strVal val="visible"/>
-                                      </p:to>
-                                    </p:set>
-                                  </p:childTnLst>
-                                </p:cTn>
-                              </p:par>
-                            </p:childTnLst>
-                          </p:cTn>
-                        </p:par>
-                      </p:childTnLst>
-                    </p:cTn>
-                  </p:par>
-                  <p:par>
-                    <p:cTn id="13" fill="hold">
-                      <p:stCondLst>
-                        <p:cond delay="indefinite"/>
-                      </p:stCondLst>
-                      <p:childTnLst>
-                        <p:par>
-                          <p:cTn id="14" fill="hold">
-                            <p:stCondLst>
-                              <p:cond delay="0"/>
-                            </p:stCondLst>
-                            <p:childTnLst>
-                              <p:par>
-                                <p:cTn id="15" presetID="1" presetClass="entr" presetSubtype="0" fill="hold" nodeType="clickEffect">
-                                  <p:stCondLst>
-                                    <p:cond delay="0"/>
-                                  </p:stCondLst>
-                                  <p:childTnLst>
-                                    <p:set>
-                                      <p:cBhvr>
-                                        <p:cTn id="16" dur="1" fill="hold">
-                                          <p:stCondLst>
-                                            <p:cond delay="0"/>
-                                          </p:stCondLst>
-                                        </p:cTn>
-                                        <p:tgtEl>
-                                          <p:spTgt spid="15"/>
-                                        </p:tgtEl>
-                                        <p:attrNameLst>
-                                          <p:attrName>style.visibility</p:attrName>
-                                        </p:attrNameLst>
-                                      </p:cBhvr>
-                                      <p:to>
-                                        <p:strVal val="visible"/>
-                                      </p:to>
-                                    </p:set>
-                                  </p:childTnLst>
-                                </p:cTn>
-                              </p:par>
-                            </p:childTnLst>
-                          </p:cTn>
-                        </p:par>
-                      </p:childTnLst>
-                    </p:cTn>
-                  </p:par>
-                  <p:par>
-                    <p:cTn id="17" fill="hold">
-                      <p:stCondLst>
-                        <p:cond delay="indefinite"/>
-                      </p:stCondLst>
-                      <p:childTnLst>
-                        <p:par>
-                          <p:cTn id="18" fill="hold">
-                            <p:stCondLst>
-                              <p:cond delay="0"/>
-                            </p:stCondLst>
-                            <p:childTnLst>
-                              <p:par>
-                                <p:cTn id="19" presetID="1" presetClass="entr" presetSubtype="0" fill="hold" nodeType="clickEffect">
-                                  <p:stCondLst>
-                                    <p:cond delay="0"/>
-                                  </p:stCondLst>
-                                  <p:childTnLst>
-                                    <p:set>
-                                      <p:cBhvr>
-                                        <p:cTn id="20" dur="1" fill="hold">
-                                          <p:stCondLst>
-                                            <p:cond delay="0"/>
-                                          </p:stCondLst>
-                                        </p:cTn>
-                                        <p:tgtEl>
-                                          <p:spTgt spid="11"/>
-                                        </p:tgtEl>
-                                        <p:attrNameLst>
-                                          <p:attrName>style.visibility</p:attrName>
-                                        </p:attrNameLst>
-                                      </p:cBhvr>
-                                      <p:to>
-                                        <p:strVal val="visible"/>
-                                      </p:to>
-                                    </p:set>
-                                  </p:childTnLst>
-                                </p:cTn>
-                              </p:par>
-                            </p:childTnLst>
-                          </p:cTn>
-                        </p:par>
-                      </p:childTnLst>
-                    </p:cTn>
-                  </p:par>
-                </p:childTnLst>
-              </p:cTn>
-              <p:prevCondLst>
-                <p:cond evt="onPrev" delay="0">
-                  <p:tgtEl>
-                    <p:sldTgt/>
-                  </p:tgtEl>
-                </p:cond>
-              </p:prevCondLst>
-              <p:nextCondLst>
-                <p:cond evt="onNext" delay="0">
-                  <p:tgtEl>
-                    <p:sldTgt/>
-                  </p:tgtEl>
-                </p:cond>
-              </p:nextCondLst>
-            </p:seq>
-          </p:childTnLst>
-        </p:cTn>
+        <p:cTn id="1" dur="indefinite" restart="never" nodeType="tmRoot"/>
       </p:par>
     </p:tnLst>
   </p:timing>
@@ -7169,7 +7177,7 @@
         </p:nvSpPr>
         <p:spPr>
           <a:xfrm>
-            <a:off x="3715096" y="4258822"/>
+            <a:off x="3708470" y="4041801"/>
             <a:ext cx="1531830" cy="369332"/>
           </a:xfrm>
           <a:prstGeom prst="rect">
@@ -7484,8 +7492,8 @@
         </p:nvSpPr>
         <p:spPr>
           <a:xfrm>
-            <a:off x="822960" y="4909351"/>
-            <a:ext cx="7586403" cy="923330"/>
+            <a:off x="681183" y="4487948"/>
+            <a:ext cx="7586403" cy="1754326"/>
           </a:xfrm>
           <a:prstGeom prst="rect">
             <a:avLst/>
@@ -7519,7 +7527,19 @@
             </a:pPr>
             <a:r>
               <a:rPr lang="en-US" dirty="0"/>
-              <a:t>P: State machine based programming language </a:t>
+              <a:t>P: State machine based </a:t>
+            </a:r>
+            <a:r>
+              <a:rPr lang="en-US" dirty="0" smtClean="0"/>
+              <a:t>language for safe event-driven programming </a:t>
+            </a:r>
+            <a:r>
+              <a:rPr lang="en-US" dirty="0" smtClean="0">
+                <a:solidFill>
+                  <a:srgbClr val="00B050"/>
+                </a:solidFill>
+              </a:rPr>
+              <a:t>[PLDI </a:t>
             </a:r>
             <a:r>
               <a:rPr lang="en-US" dirty="0">
@@ -7527,9 +7547,16 @@
                   <a:srgbClr val="00B050"/>
                 </a:solidFill>
               </a:rPr>
-              <a:t>[PLDI 2013].</a:t>
-            </a:r>
-            <a:endParaRPr lang="en-US" dirty="0"/>
+              <a:t>2013</a:t>
+            </a:r>
+            <a:r>
+              <a:rPr lang="en-US" dirty="0" smtClean="0">
+                <a:solidFill>
+                  <a:srgbClr val="00B050"/>
+                </a:solidFill>
+              </a:rPr>
+              <a:t>].</a:t>
+            </a:r>
           </a:p>
           <a:p>
             <a:pPr marL="285750" indent="-285750">
@@ -7538,7 +7565,78 @@
             </a:pPr>
             <a:r>
               <a:rPr lang="en-US" dirty="0" smtClean="0"/>
-              <a:t>Modular P</a:t>
+              <a:t>P#:</a:t>
+            </a:r>
+            <a:r>
+              <a:rPr lang="en-US" dirty="0">
+                <a:solidFill>
+                  <a:srgbClr val="00B050"/>
+                </a:solidFill>
+              </a:rPr>
+              <a:t> </a:t>
+            </a:r>
+            <a:r>
+              <a:rPr lang="en-US" dirty="0"/>
+              <a:t>Asynchronous </a:t>
+            </a:r>
+            <a:r>
+              <a:rPr lang="en-US" dirty="0" smtClean="0"/>
+              <a:t>programming</a:t>
+            </a:r>
+            <a:r>
+              <a:rPr lang="en-US" dirty="0"/>
+              <a:t>, </a:t>
+            </a:r>
+            <a:r>
+              <a:rPr lang="en-US" dirty="0" smtClean="0"/>
+              <a:t>analysis </a:t>
+            </a:r>
+            <a:r>
+              <a:rPr lang="en-US" dirty="0"/>
+              <a:t>and </a:t>
+            </a:r>
+            <a:r>
+              <a:rPr lang="en-US" dirty="0" smtClean="0"/>
+              <a:t>testing </a:t>
+            </a:r>
+            <a:r>
+              <a:rPr lang="en-US" dirty="0"/>
+              <a:t>with State </a:t>
+            </a:r>
+            <a:r>
+              <a:rPr lang="en-US" dirty="0" smtClean="0"/>
+              <a:t>machines in C# </a:t>
+            </a:r>
+            <a:r>
+              <a:rPr lang="en-US" dirty="0" smtClean="0">
+                <a:solidFill>
+                  <a:srgbClr val="00B050"/>
+                </a:solidFill>
+              </a:rPr>
+              <a:t>[PLDI 2015].</a:t>
+            </a:r>
+            <a:endParaRPr lang="en-US" dirty="0">
+              <a:solidFill>
+                <a:srgbClr val="00B050"/>
+              </a:solidFill>
+            </a:endParaRPr>
+          </a:p>
+          <a:p>
+            <a:pPr marL="285750" indent="-285750">
+              <a:buFont typeface="Arial" panose="020B0604020202020204" pitchFamily="34" charset="0"/>
+              <a:buChar char="•"/>
+            </a:pPr>
+            <a:r>
+              <a:rPr lang="en-US" dirty="0" smtClean="0"/>
+              <a:t>Modular</a:t>
+            </a:r>
+            <a:r>
+              <a:rPr lang="en-US" dirty="0" smtClean="0"/>
+              <a:t> </a:t>
+            </a:r>
+            <a:r>
+              <a:rPr lang="en-US" dirty="0" smtClean="0"/>
+              <a:t>P</a:t>
             </a:r>
             <a:r>
               <a:rPr lang="en-US" dirty="0"/>
@@ -7581,6 +7679,13 @@
   <p:clrMapOvr>
     <a:masterClrMapping/>
   </p:clrMapOvr>
+  <p:timing>
+    <p:tnLst>
+      <p:par>
+        <p:cTn id="1" dur="indefinite" restart="never" nodeType="tmRoot"/>
+      </p:par>
+    </p:tnLst>
+  </p:timing>
 </p:sld>
 </file>
 
@@ -8478,8 +8583,13 @@
           <a:p>
             <a:r>
               <a:rPr lang="en-US" sz="1600" dirty="0"/>
-              <a:t>Scalable Analysis of Event-Driven Programs:</a:t>
-            </a:r>
+              <a:t>Scalable Analysis of Event-Driven Programs</a:t>
+            </a:r>
+            <a:r>
+              <a:rPr lang="en-US" sz="1600" dirty="0" smtClean="0"/>
+              <a:t>:</a:t>
+            </a:r>
+            <a:endParaRPr lang="en-US" sz="1600" dirty="0"/>
           </a:p>
           <a:p>
             <a:pPr marL="285750" indent="-285750">
@@ -8488,7 +8598,23 @@
             </a:pPr>
             <a:r>
               <a:rPr lang="en-US" sz="1600" dirty="0" smtClean="0"/>
-              <a:t>Reduction</a:t>
+              <a:t>Search </a:t>
+            </a:r>
+            <a:r>
+              <a:rPr lang="en-US" sz="1600" dirty="0"/>
+              <a:t>Prioritization </a:t>
+            </a:r>
+            <a:r>
+              <a:rPr lang="en-US" sz="1600" dirty="0" smtClean="0"/>
+              <a:t>and Random Testing </a:t>
+            </a:r>
+            <a:r>
+              <a:rPr lang="en-US" sz="1600" dirty="0" smtClean="0">
+                <a:solidFill>
+                  <a:srgbClr val="00B050"/>
+                </a:solidFill>
+              </a:rPr>
+              <a:t>[FSE </a:t>
             </a:r>
             <a:r>
               <a:rPr lang="en-US" sz="1600" dirty="0">
@@ -8496,31 +8622,7 @@
                   <a:srgbClr val="00B050"/>
                 </a:solidFill>
               </a:rPr>
-              <a:t> [OOPSLA 2014] [CAV 2015]</a:t>
-            </a:r>
-            <a:r>
-              <a:rPr lang="en-US" sz="1600" dirty="0" smtClean="0"/>
-              <a:t>, Search </a:t>
-            </a:r>
-            <a:r>
-              <a:rPr lang="en-US" sz="1600" dirty="0"/>
-              <a:t>Prioritization </a:t>
-            </a:r>
-            <a:r>
-              <a:rPr lang="en-US" sz="1600" dirty="0" smtClean="0">
-                <a:solidFill>
-                  <a:srgbClr val="00B050"/>
-                </a:solidFill>
-              </a:rPr>
-              <a:t>[</a:t>
-            </a:r>
-            <a:r>
-              <a:rPr lang="en-US" sz="1600" dirty="0">
-                <a:solidFill>
-                  <a:srgbClr val="00B050"/>
-                </a:solidFill>
-              </a:rPr>
-              <a:t>FSE 2015</a:t>
+              <a:t>2015</a:t>
             </a:r>
             <a:r>
               <a:rPr lang="en-US" sz="1600" dirty="0" smtClean="0">
@@ -8531,12 +8633,8 @@
               <a:t>]</a:t>
             </a:r>
             <a:r>
-              <a:rPr lang="en-US" sz="1600" dirty="0"/>
-              <a:t>, Symbolic </a:t>
-            </a:r>
-            <a:r>
               <a:rPr lang="en-US" sz="1600" dirty="0" smtClean="0"/>
-              <a:t>Execution </a:t>
+              <a:t>, </a:t>
             </a:r>
             <a:r>
               <a:rPr lang="en-US" sz="1600" dirty="0" smtClean="0">
@@ -8544,16 +8642,31 @@
                   <a:srgbClr val="00B050"/>
                 </a:solidFill>
               </a:rPr>
-              <a:t>[</a:t>
-            </a:r>
-            <a:r>
-              <a:rPr lang="en-US" sz="1600" dirty="0">
+              <a:t>[PLDI 2015].</a:t>
+            </a:r>
+          </a:p>
+          <a:p>
+            <a:pPr marL="285750" indent="-285750">
+              <a:buFont typeface="Arial" panose="020B0604020202020204" pitchFamily="34" charset="0"/>
+              <a:buChar char="•"/>
+            </a:pPr>
+            <a:r>
+              <a:rPr lang="en-US" sz="1600" dirty="0" smtClean="0"/>
+              <a:t>Lasso Detection for Liveness Testing </a:t>
+            </a:r>
+            <a:r>
+              <a:rPr lang="en-US" sz="1600" dirty="0" smtClean="0">
                 <a:solidFill>
                   <a:srgbClr val="00B050"/>
                 </a:solidFill>
               </a:rPr>
-              <a:t>in submission].</a:t>
-            </a:r>
+              <a:t>[FMCAD 2017]</a:t>
+            </a:r>
+            <a:endParaRPr lang="en-US" sz="1600" dirty="0">
+              <a:solidFill>
+                <a:srgbClr val="00B050"/>
+              </a:solidFill>
+            </a:endParaRPr>
           </a:p>
         </p:txBody>
       </p:sp>
@@ -8567,6 +8680,13 @@
   <p:clrMapOvr>
     <a:masterClrMapping/>
   </p:clrMapOvr>
+  <p:timing>
+    <p:tnLst>
+      <p:par>
+        <p:cTn id="1" dur="indefinite" restart="never" nodeType="tmRoot"/>
+      </p:par>
+    </p:tnLst>
+  </p:timing>
 </p:sld>
 </file>
 
@@ -10077,8 +10197,8 @@
         </p:nvSpPr>
         <p:spPr>
           <a:xfrm>
-            <a:off x="842926" y="4707346"/>
-            <a:ext cx="7586403" cy="1200329"/>
+            <a:off x="819148" y="4992728"/>
+            <a:ext cx="8002900" cy="1200329"/>
           </a:xfrm>
           <a:prstGeom prst="rect">
             <a:avLst/>
@@ -10159,17 +10279,34 @@
               <a:t>Fault Tolerant Distributed Systems </a:t>
             </a:r>
             <a:r>
+              <a:rPr lang="en-US" dirty="0" smtClean="0">
+                <a:solidFill>
+                  <a:srgbClr val="00B050"/>
+                </a:solidFill>
+              </a:rPr>
+              <a:t>[FAST 2016, </a:t>
+            </a:r>
+            <a:r>
               <a:rPr lang="en-US" dirty="0">
                 <a:solidFill>
                   <a:srgbClr val="00B050"/>
                 </a:solidFill>
               </a:rPr>
-              <a:t>[Microsoft Azure, OOPSLA 2018]</a:t>
-            </a:r>
-            <a:r>
-              <a:rPr lang="en-US" dirty="0"/>
+              <a:t>OOPSLA </a:t>
+            </a:r>
+            <a:r>
+              <a:rPr lang="en-US" dirty="0" smtClean="0">
+                <a:solidFill>
+                  <a:srgbClr val="00B050"/>
+                </a:solidFill>
+              </a:rPr>
+              <a:t>2018, ECOOP2019]</a:t>
+            </a:r>
+            <a:r>
+              <a:rPr lang="en-US" dirty="0" smtClean="0"/>
               <a:t>.</a:t>
             </a:r>
+            <a:endParaRPr lang="en-US" dirty="0"/>
           </a:p>
           <a:p>
             <a:pPr marL="285750" indent="-285750">
@@ -10194,15 +10331,7 @@
                   <a:srgbClr val="00B050"/>
                 </a:solidFill>
               </a:rPr>
-              <a:t>, RV 2017, </a:t>
-            </a:r>
-            <a:r>
-              <a:rPr lang="en-US" dirty="0" err="1" smtClean="0">
-                <a:solidFill>
-                  <a:srgbClr val="00B050"/>
-                </a:solidFill>
-              </a:rPr>
-              <a:t>ISoLA</a:t>
+              <a:t>, </a:t>
             </a:r>
             <a:r>
               <a:rPr lang="en-US" dirty="0" smtClean="0">
@@ -10210,7 +10339,7 @@
                   <a:srgbClr val="00B050"/>
                 </a:solidFill>
               </a:rPr>
-              <a:t> 2018]</a:t>
+              <a:t>DSN 2019]</a:t>
             </a:r>
             <a:endParaRPr lang="en-US" dirty="0">
               <a:solidFill>
@@ -10230,6 +10359,13 @@
   <p:clrMapOvr>
     <a:masterClrMapping/>
   </p:clrMapOvr>
+  <p:timing>
+    <p:tnLst>
+      <p:par>
+        <p:cTn id="1" dur="indefinite" restart="never" nodeType="tmRoot"/>
+      </p:par>
+    </p:tnLst>
+  </p:timing>
 </p:sld>
 </file>
 

</xml_diff>